<commit_message>
Notificaciones de gmail para la reserva y pdf
</commit_message>
<xml_diff>
--- a/DOCUMENTACION DE MASTER BARBER/DOCUMENTACION DE APOYO/HU.pptx
+++ b/DOCUMENTACION DE MASTER BARBER/DOCUMENTACION DE APOYO/HU.pptx
@@ -263,7 +263,7 @@
           <a:p>
             <a:fld id="{ADFB7999-3A0C-49D2-A44D-24F0DB0801D8}" type="datetimeFigureOut">
               <a:rPr lang="es-CO" smtClean="0"/>
-              <a:t>5/04/2024</a:t>
+              <a:t>7/04/2025</a:t>
             </a:fld>
             <a:endParaRPr lang="es-CO"/>
           </a:p>
@@ -463,7 +463,7 @@
           <a:p>
             <a:fld id="{ADFB7999-3A0C-49D2-A44D-24F0DB0801D8}" type="datetimeFigureOut">
               <a:rPr lang="es-CO" smtClean="0"/>
-              <a:t>5/04/2024</a:t>
+              <a:t>7/04/2025</a:t>
             </a:fld>
             <a:endParaRPr lang="es-CO"/>
           </a:p>
@@ -673,7 +673,7 @@
           <a:p>
             <a:fld id="{ADFB7999-3A0C-49D2-A44D-24F0DB0801D8}" type="datetimeFigureOut">
               <a:rPr lang="es-CO" smtClean="0"/>
-              <a:t>5/04/2024</a:t>
+              <a:t>7/04/2025</a:t>
             </a:fld>
             <a:endParaRPr lang="es-CO"/>
           </a:p>
@@ -873,7 +873,7 @@
           <a:p>
             <a:fld id="{ADFB7999-3A0C-49D2-A44D-24F0DB0801D8}" type="datetimeFigureOut">
               <a:rPr lang="es-CO" smtClean="0"/>
-              <a:t>5/04/2024</a:t>
+              <a:t>7/04/2025</a:t>
             </a:fld>
             <a:endParaRPr lang="es-CO"/>
           </a:p>
@@ -1149,7 +1149,7 @@
           <a:p>
             <a:fld id="{ADFB7999-3A0C-49D2-A44D-24F0DB0801D8}" type="datetimeFigureOut">
               <a:rPr lang="es-CO" smtClean="0"/>
-              <a:t>5/04/2024</a:t>
+              <a:t>7/04/2025</a:t>
             </a:fld>
             <a:endParaRPr lang="es-CO"/>
           </a:p>
@@ -1417,7 +1417,7 @@
           <a:p>
             <a:fld id="{ADFB7999-3A0C-49D2-A44D-24F0DB0801D8}" type="datetimeFigureOut">
               <a:rPr lang="es-CO" smtClean="0"/>
-              <a:t>5/04/2024</a:t>
+              <a:t>7/04/2025</a:t>
             </a:fld>
             <a:endParaRPr lang="es-CO"/>
           </a:p>
@@ -1832,7 +1832,7 @@
           <a:p>
             <a:fld id="{ADFB7999-3A0C-49D2-A44D-24F0DB0801D8}" type="datetimeFigureOut">
               <a:rPr lang="es-CO" smtClean="0"/>
-              <a:t>5/04/2024</a:t>
+              <a:t>7/04/2025</a:t>
             </a:fld>
             <a:endParaRPr lang="es-CO"/>
           </a:p>
@@ -1974,7 +1974,7 @@
           <a:p>
             <a:fld id="{ADFB7999-3A0C-49D2-A44D-24F0DB0801D8}" type="datetimeFigureOut">
               <a:rPr lang="es-CO" smtClean="0"/>
-              <a:t>5/04/2024</a:t>
+              <a:t>7/04/2025</a:t>
             </a:fld>
             <a:endParaRPr lang="es-CO"/>
           </a:p>
@@ -2087,7 +2087,7 @@
           <a:p>
             <a:fld id="{ADFB7999-3A0C-49D2-A44D-24F0DB0801D8}" type="datetimeFigureOut">
               <a:rPr lang="es-CO" smtClean="0"/>
-              <a:t>5/04/2024</a:t>
+              <a:t>7/04/2025</a:t>
             </a:fld>
             <a:endParaRPr lang="es-CO"/>
           </a:p>
@@ -2400,7 +2400,7 @@
           <a:p>
             <a:fld id="{ADFB7999-3A0C-49D2-A44D-24F0DB0801D8}" type="datetimeFigureOut">
               <a:rPr lang="es-CO" smtClean="0"/>
-              <a:t>5/04/2024</a:t>
+              <a:t>7/04/2025</a:t>
             </a:fld>
             <a:endParaRPr lang="es-CO"/>
           </a:p>
@@ -2689,7 +2689,7 @@
           <a:p>
             <a:fld id="{ADFB7999-3A0C-49D2-A44D-24F0DB0801D8}" type="datetimeFigureOut">
               <a:rPr lang="es-CO" smtClean="0"/>
-              <a:t>5/04/2024</a:t>
+              <a:t>7/04/2025</a:t>
             </a:fld>
             <a:endParaRPr lang="es-CO"/>
           </a:p>
@@ -2932,7 +2932,7 @@
           <a:p>
             <a:fld id="{ADFB7999-3A0C-49D2-A44D-24F0DB0801D8}" type="datetimeFigureOut">
               <a:rPr lang="es-CO" smtClean="0"/>
-              <a:t>5/04/2024</a:t>
+              <a:t>7/04/2025</a:t>
             </a:fld>
             <a:endParaRPr lang="es-CO"/>
           </a:p>
@@ -3364,7 +3364,7 @@
           <p:nvPr>
             <p:extLst>
               <p:ext uri="{D42A27DB-BD31-4B8C-83A1-F6EECF244321}">
-                <p14:modId xmlns:p14="http://schemas.microsoft.com/office/powerpoint/2010/main" val="1840797129"/>
+                <p14:modId xmlns:p14="http://schemas.microsoft.com/office/powerpoint/2010/main" val="1841906922"/>
               </p:ext>
             </p:extLst>
           </p:nvPr>
@@ -3415,6 +3415,7 @@
                     <a:bodyPr/>
                     <a:lstStyle/>
                     <a:p>
+                      <a:pPr algn="ctr"/>
                       <a:r>
                         <a:rPr lang="es-ES" sz="1000" dirty="0"/>
                         <a:t>CODIGO HISTORIA DE USUARIO</a:t>
@@ -3433,6 +3434,7 @@
                     <a:bodyPr/>
                     <a:lstStyle/>
                     <a:p>
+                      <a:pPr algn="ctr"/>
                       <a:r>
                         <a:rPr lang="es-ES" sz="1000" dirty="0"/>
                         <a:t>CODIGO CASO DE USO</a:t>
@@ -3451,6 +3453,7 @@
                     <a:bodyPr/>
                     <a:lstStyle/>
                     <a:p>
+                      <a:pPr algn="ctr"/>
                       <a:r>
                         <a:rPr lang="es-ES" sz="1000" dirty="0"/>
                         <a:t>HISTORIA DE USUARIO</a:t>
@@ -3469,6 +3472,7 @@
                     <a:bodyPr/>
                     <a:lstStyle/>
                     <a:p>
+                      <a:pPr algn="ctr"/>
                       <a:r>
                         <a:rPr lang="es-ES" sz="1000" dirty="0"/>
                         <a:t>CRITERIOS DE ACEPTACION</a:t>

</xml_diff>

<commit_message>
Server y historias de usuario
</commit_message>
<xml_diff>
--- a/DOCUMENTACION DE MASTER BARBER/DOCUMENTACION DE APOYO/HU.pptx
+++ b/DOCUMENTACION DE MASTER BARBER/DOCUMENTACION DE APOYO/HU.pptx
@@ -263,7 +263,7 @@
           <a:p>
             <a:fld id="{ADFB7999-3A0C-49D2-A44D-24F0DB0801D8}" type="datetimeFigureOut">
               <a:rPr lang="es-CO" smtClean="0"/>
-              <a:t>7/04/2025</a:t>
+              <a:t>9/04/2025</a:t>
             </a:fld>
             <a:endParaRPr lang="es-CO"/>
           </a:p>
@@ -463,7 +463,7 @@
           <a:p>
             <a:fld id="{ADFB7999-3A0C-49D2-A44D-24F0DB0801D8}" type="datetimeFigureOut">
               <a:rPr lang="es-CO" smtClean="0"/>
-              <a:t>7/04/2025</a:t>
+              <a:t>9/04/2025</a:t>
             </a:fld>
             <a:endParaRPr lang="es-CO"/>
           </a:p>
@@ -673,7 +673,7 @@
           <a:p>
             <a:fld id="{ADFB7999-3A0C-49D2-A44D-24F0DB0801D8}" type="datetimeFigureOut">
               <a:rPr lang="es-CO" smtClean="0"/>
-              <a:t>7/04/2025</a:t>
+              <a:t>9/04/2025</a:t>
             </a:fld>
             <a:endParaRPr lang="es-CO"/>
           </a:p>
@@ -873,7 +873,7 @@
           <a:p>
             <a:fld id="{ADFB7999-3A0C-49D2-A44D-24F0DB0801D8}" type="datetimeFigureOut">
               <a:rPr lang="es-CO" smtClean="0"/>
-              <a:t>7/04/2025</a:t>
+              <a:t>9/04/2025</a:t>
             </a:fld>
             <a:endParaRPr lang="es-CO"/>
           </a:p>
@@ -1149,7 +1149,7 @@
           <a:p>
             <a:fld id="{ADFB7999-3A0C-49D2-A44D-24F0DB0801D8}" type="datetimeFigureOut">
               <a:rPr lang="es-CO" smtClean="0"/>
-              <a:t>7/04/2025</a:t>
+              <a:t>9/04/2025</a:t>
             </a:fld>
             <a:endParaRPr lang="es-CO"/>
           </a:p>
@@ -1417,7 +1417,7 @@
           <a:p>
             <a:fld id="{ADFB7999-3A0C-49D2-A44D-24F0DB0801D8}" type="datetimeFigureOut">
               <a:rPr lang="es-CO" smtClean="0"/>
-              <a:t>7/04/2025</a:t>
+              <a:t>9/04/2025</a:t>
             </a:fld>
             <a:endParaRPr lang="es-CO"/>
           </a:p>
@@ -1832,7 +1832,7 @@
           <a:p>
             <a:fld id="{ADFB7999-3A0C-49D2-A44D-24F0DB0801D8}" type="datetimeFigureOut">
               <a:rPr lang="es-CO" smtClean="0"/>
-              <a:t>7/04/2025</a:t>
+              <a:t>9/04/2025</a:t>
             </a:fld>
             <a:endParaRPr lang="es-CO"/>
           </a:p>
@@ -1974,7 +1974,7 @@
           <a:p>
             <a:fld id="{ADFB7999-3A0C-49D2-A44D-24F0DB0801D8}" type="datetimeFigureOut">
               <a:rPr lang="es-CO" smtClean="0"/>
-              <a:t>7/04/2025</a:t>
+              <a:t>9/04/2025</a:t>
             </a:fld>
             <a:endParaRPr lang="es-CO"/>
           </a:p>
@@ -2087,7 +2087,7 @@
           <a:p>
             <a:fld id="{ADFB7999-3A0C-49D2-A44D-24F0DB0801D8}" type="datetimeFigureOut">
               <a:rPr lang="es-CO" smtClean="0"/>
-              <a:t>7/04/2025</a:t>
+              <a:t>9/04/2025</a:t>
             </a:fld>
             <a:endParaRPr lang="es-CO"/>
           </a:p>
@@ -2400,7 +2400,7 @@
           <a:p>
             <a:fld id="{ADFB7999-3A0C-49D2-A44D-24F0DB0801D8}" type="datetimeFigureOut">
               <a:rPr lang="es-CO" smtClean="0"/>
-              <a:t>7/04/2025</a:t>
+              <a:t>9/04/2025</a:t>
             </a:fld>
             <a:endParaRPr lang="es-CO"/>
           </a:p>
@@ -2689,7 +2689,7 @@
           <a:p>
             <a:fld id="{ADFB7999-3A0C-49D2-A44D-24F0DB0801D8}" type="datetimeFigureOut">
               <a:rPr lang="es-CO" smtClean="0"/>
-              <a:t>7/04/2025</a:t>
+              <a:t>9/04/2025</a:t>
             </a:fld>
             <a:endParaRPr lang="es-CO"/>
           </a:p>
@@ -2932,7 +2932,7 @@
           <a:p>
             <a:fld id="{ADFB7999-3A0C-49D2-A44D-24F0DB0801D8}" type="datetimeFigureOut">
               <a:rPr lang="es-CO" smtClean="0"/>
-              <a:t>7/04/2025</a:t>
+              <a:t>9/04/2025</a:t>
             </a:fld>
             <a:endParaRPr lang="es-CO"/>
           </a:p>
@@ -3364,14 +3364,14 @@
           <p:nvPr>
             <p:extLst>
               <p:ext uri="{D42A27DB-BD31-4B8C-83A1-F6EECF244321}">
-                <p14:modId xmlns:p14="http://schemas.microsoft.com/office/powerpoint/2010/main" val="1841906922"/>
+                <p14:modId xmlns:p14="http://schemas.microsoft.com/office/powerpoint/2010/main" val="348710229"/>
               </p:ext>
             </p:extLst>
           </p:nvPr>
         </p:nvGraphicFramePr>
         <p:xfrm>
           <a:off x="440404" y="153298"/>
-          <a:ext cx="10742759" cy="6480443"/>
+          <a:ext cx="10742759" cy="6328043"/>
         </p:xfrm>
         <a:graphic>
           <a:graphicData uri="http://schemas.openxmlformats.org/drawingml/2006/table">
@@ -3564,7 +3564,7 @@
                       </a:pPr>
                       <a:r>
                         <a:rPr lang="es-MX" sz="1000" dirty="0"/>
-                        <a:t>Que se cuente con un botón de Inicio de Sesión el cual despliega un formulario que diga correo y contraseña</a:t>
+                        <a:t>Que se cuente con un sistema de Inicio de Sesión el cual despliegue un formulario que diga correo y contraseña</a:t>
                       </a:r>
                     </a:p>
                     <a:p>
@@ -3584,7 +3584,7 @@
                       </a:pPr>
                       <a:r>
                         <a:rPr lang="es-MX" sz="1000" dirty="0"/>
-                        <a:t>La contraseña debe estar oculta con círculos negros y debe estar encriptada </a:t>
+                        <a:t>La contraseña no se debe de mostrar y mantenerla privada, también tenerla encriptada </a:t>
                       </a:r>
                     </a:p>
                     <a:p>
@@ -3695,7 +3695,7 @@
                       </a:pPr>
                       <a:r>
                         <a:rPr lang="es-MX" sz="1000" dirty="0"/>
-                        <a:t>Se  debe ingresar el correo en el cual desea recibir el código de recuperación </a:t>
+                        <a:t>Debe ingresar el correo que ya tiene registrado en el sistema, en el llegara un código de recuperación  </a:t>
                       </a:r>
                     </a:p>
                     <a:p>
@@ -3705,7 +3705,7 @@
                       </a:pPr>
                       <a:r>
                         <a:rPr lang="es-MX" sz="1000" dirty="0"/>
-                        <a:t>Se ingresa el código y se hace el cambio de contraseña</a:t>
+                        <a:t>Ingresa el código y se hace el cambio de contraseña</a:t>
                       </a:r>
                     </a:p>
                     <a:p>
@@ -3823,8 +3823,21 @@
                       </a:pPr>
                       <a:r>
                         <a:rPr lang="es-ES" sz="1000" dirty="0"/>
-                        <a:t>Después de agregar un producto, el producto debería ser reflejado en el stock. </a:t>
-                      </a:r>
+                        <a:t>El producto </a:t>
+                      </a:r>
+                      <a:r>
+                        <a:rPr lang="es-ES" sz="1000"/>
+                        <a:t>se agregará </a:t>
+                      </a:r>
+                      <a:r>
+                        <a:rPr lang="es-ES" sz="1000" dirty="0"/>
+                        <a:t>al inventario de </a:t>
+                      </a:r>
+                      <a:r>
+                        <a:rPr lang="es-ES" sz="1000"/>
+                        <a:t>inmediato  </a:t>
+                      </a:r>
+                      <a:endParaRPr lang="es-ES" sz="1000" dirty="0"/>
                     </a:p>
                     <a:p>
                       <a:r>

</xml_diff>